<commit_message>
add dynamic titles to all output
</commit_message>
<xml_diff>
--- a/gallery-output/slides/index.pptx
+++ b/gallery-output/slides/index.pptx
@@ -3164,7 +3164,17 @@
             </a:r>
             <a:r>
               <a:rPr/>
-              <a:t>floor</a:t>
+              <a:t>floor:</a:t>
+            </a:r>
+            <a:r>
+              <a:rPr/>
+              <a:t> </a:t>
+            </a:r>
+            <a:r>
+              <a:rPr sz="1800">
+                <a:latin typeface="Courier"/>
+              </a:rPr>
+              <a:t>powerpoint_presentation</a:t>
             </a:r>
           </a:p>
         </p:txBody>

</xml_diff>